<commit_message>
Minor updates and additions
</commit_message>
<xml_diff>
--- a/Courses/Computer-Modeling-and-IT/Computer-Modeling-and-IT-6-Class/09-Data-Types-and-Cell-Formats/09-Data-Types-and-Cell-Formats.pptx
+++ b/Courses/Computer-Modeling-and-IT/Computer-Modeling-and-IT-6-Class/09-Data-Types-and-Cell-Formats/09-Data-Types-and-Cell-Formats.pptx
@@ -263,7 +263,7 @@
           <a:p>
             <a:fld id="{4E087215-0C8F-4762-A664-737A353EC9A4}" type="datetimeFigureOut">
               <a:rPr lang="bg-BG" smtClean="0"/>
-              <a:t>27.4.2024 г.</a:t>
+              <a:t>4.06.24 г.</a:t>
             </a:fld>
             <a:endParaRPr lang="bg-BG"/>
           </a:p>
@@ -459,7 +459,7 @@
           <a:p>
             <a:fld id="{72D84649-876A-46C9-8472-14CB09C070D8}" type="datetimeFigureOut">
               <a:rPr lang="en-US" smtClean="0"/>
-              <a:t>4/27/2024</a:t>
+              <a:t>6/4/24</a:t>
             </a:fld>
             <a:endParaRPr lang="en-US"/>
           </a:p>
@@ -6781,16 +6781,12 @@
           <a:lstStyle/>
           <a:p>
             <a:r>
-              <a:rPr lang="en-US" dirty="0" smtClean="0"/>
+              <a:rPr lang="en-US" dirty="0"/>
               <a:t>6</a:t>
             </a:r>
             <a:r>
-              <a:rPr lang="bg-BG" dirty="0" smtClean="0"/>
-              <a:t> </a:t>
-            </a:r>
-            <a:r>
               <a:rPr lang="bg-BG" dirty="0"/>
-              <a:t>клас</a:t>
+              <a:t> клас</a:t>
             </a:r>
           </a:p>
         </p:txBody>
@@ -7029,13 +7025,6 @@
       <p:transition spd="slow" advClick="0" advTm="5000"/>
     </mc:Fallback>
   </mc:AlternateContent>
-  <p:timing>
-    <p:tnLst>
-      <p:par>
-        <p:cTn id="1" dur="indefinite" restart="never" nodeType="tmRoot"/>
-      </p:par>
-    </p:tnLst>
-  </p:timing>
 </p:sld>
 </file>
 
@@ -7153,7 +7142,7 @@
                 <a:hlinkClick r:id="rId3">
                   <a:extLst>
                     <a:ext uri="{A12FA001-AC4F-418D-AE19-62706E023703}">
-                      <ahyp:hlinkClr xmlns:ahyp="http://schemas.microsoft.com/office/drawing/2018/hyperlinkcolor" xmlns="" val="tx"/>
+                      <ahyp:hlinkClr xmlns:ahyp="http://schemas.microsoft.com/office/drawing/2018/hyperlinkcolor" val="tx"/>
                     </a:ext>
                   </a:extLst>
                 </a:hlinkClick>
@@ -7226,18 +7215,11 @@
       <p:transition spd="slow" advClick="0" advTm="5000"/>
     </mc:Fallback>
   </mc:AlternateContent>
-  <p:timing>
-    <p:tnLst>
-      <p:par>
-        <p:cTn id="1" dur="indefinite" restart="never" nodeType="tmRoot"/>
-      </p:par>
-    </p:tnLst>
-  </p:timing>
 </p:sld>
 </file>
 
 <file path=ppt/slides/slide11.xml><?xml version="1.0" encoding="utf-8"?>
-<p:sld xmlns:a="http://schemas.openxmlformats.org/drawingml/2006/main" xmlns:r="http://schemas.openxmlformats.org/officeDocument/2006/relationships" xmlns:p="http://schemas.openxmlformats.org/presentationml/2006/main">
+<p:sld xmlns:a="http://schemas.openxmlformats.org/drawingml/2006/main" xmlns:r="http://schemas.openxmlformats.org/officeDocument/2006/relationships" xmlns:p="http://schemas.openxmlformats.org/presentationml/2006/main" show="0">
   <p:cSld>
     <p:spTree>
       <p:nvGrpSpPr>
@@ -7608,21 +7590,14 @@
   <p:clrMapOvr>
     <a:masterClrMapping/>
   </p:clrMapOvr>
-  <mc:AlternateContent xmlns:mc="http://schemas.openxmlformats.org/markup-compatibility/2006" xmlns:p14="http://schemas.microsoft.com/office/powerpoint/2010/main">
-    <mc:Choice Requires="p14">
+  <mc:AlternateContent xmlns:mc="http://schemas.openxmlformats.org/markup-compatibility/2006">
+    <mc:Choice xmlns:p14="http://schemas.microsoft.com/office/powerpoint/2010/main" Requires="p14">
       <p:transition spd="slow" p14:dur="2000" advClick="0" advTm="5000"/>
     </mc:Choice>
-    <mc:Fallback xmlns="">
+    <mc:Fallback>
       <p:transition spd="slow" advClick="0" advTm="5000"/>
     </mc:Fallback>
   </mc:AlternateContent>
-  <p:timing>
-    <p:tnLst>
-      <p:par>
-        <p:cTn id="1" dur="indefinite" restart="never" nodeType="tmRoot"/>
-      </p:par>
-    </p:tnLst>
-  </p:timing>
 </p:sld>
 </file>
 
@@ -7794,18 +7769,25 @@
           <a:lstStyle/>
           <a:p>
             <a:r>
-              <a:rPr lang="bg-BG" dirty="0" smtClean="0"/>
-              <a:t>Типове </a:t>
-            </a:r>
-            <a:r>
-              <a:rPr lang="bg-BG" dirty="0" smtClean="0"/>
-              <a:t>данни и формат на представяне на </a:t>
-            </a:r>
-            <a:r>
-              <a:rPr lang="bg-BG" dirty="0" smtClean="0"/>
-              <a:t>данните</a:t>
-            </a:r>
-            <a:endParaRPr lang="bg-BG" dirty="0" smtClean="0"/>
+              <a:rPr lang="bg-BG" dirty="0"/>
+              <a:t>Типове данни в </a:t>
+            </a:r>
+            <a:r>
+              <a:rPr lang="en-US" dirty="0"/>
+              <a:t>Excel</a:t>
+            </a:r>
+          </a:p>
+          <a:p>
+            <a:r>
+              <a:rPr lang="bg-BG" dirty="0"/>
+              <a:t>Формат на представяне на данните</a:t>
+            </a:r>
+          </a:p>
+          <a:p>
+            <a:r>
+              <a:rPr lang="bg-BG" dirty="0"/>
+              <a:t>Пример: работа с типове данни</a:t>
+            </a:r>
           </a:p>
         </p:txBody>
       </p:sp>
@@ -7907,7 +7889,128 @@
   <p:timing>
     <p:tnLst>
       <p:par>
-        <p:cTn id="1" dur="indefinite" restart="never" nodeType="tmRoot"/>
+        <p:cTn id="1" dur="indefinite" restart="never" nodeType="tmRoot">
+          <p:childTnLst>
+            <p:seq concurrent="1" nextAc="seek">
+              <p:cTn id="2" dur="indefinite" nodeType="mainSeq">
+                <p:childTnLst>
+                  <p:par>
+                    <p:cTn id="3" fill="hold">
+                      <p:stCondLst>
+                        <p:cond delay="indefinite"/>
+                      </p:stCondLst>
+                      <p:childTnLst>
+                        <p:par>
+                          <p:cTn id="4" fill="hold">
+                            <p:stCondLst>
+                              <p:cond delay="0"/>
+                            </p:stCondLst>
+                            <p:childTnLst>
+                              <p:par>
+                                <p:cTn id="5" presetID="1" presetClass="entr" presetSubtype="0" fill="hold" nodeType="clickEffect">
+                                  <p:stCondLst>
+                                    <p:cond delay="0"/>
+                                  </p:stCondLst>
+                                  <p:childTnLst>
+                                    <p:set>
+                                      <p:cBhvr>
+                                        <p:cTn id="6" dur="1" fill="hold">
+                                          <p:stCondLst>
+                                            <p:cond delay="0"/>
+                                          </p:stCondLst>
+                                        </p:cTn>
+                                        <p:tgtEl>
+                                          <p:spTgt spid="444419">
+                                            <p:txEl>
+                                              <p:pRg st="1" end="1"/>
+                                            </p:txEl>
+                                          </p:spTgt>
+                                        </p:tgtEl>
+                                        <p:attrNameLst>
+                                          <p:attrName>style.visibility</p:attrName>
+                                        </p:attrNameLst>
+                                      </p:cBhvr>
+                                      <p:to>
+                                        <p:strVal val="visible"/>
+                                      </p:to>
+                                    </p:set>
+                                  </p:childTnLst>
+                                </p:cTn>
+                              </p:par>
+                            </p:childTnLst>
+                          </p:cTn>
+                        </p:par>
+                      </p:childTnLst>
+                    </p:cTn>
+                  </p:par>
+                  <p:par>
+                    <p:cTn id="7" fill="hold">
+                      <p:stCondLst>
+                        <p:cond delay="indefinite"/>
+                      </p:stCondLst>
+                      <p:childTnLst>
+                        <p:par>
+                          <p:cTn id="8" fill="hold">
+                            <p:stCondLst>
+                              <p:cond delay="0"/>
+                            </p:stCondLst>
+                            <p:childTnLst>
+                              <p:par>
+                                <p:cTn id="9" presetID="1" presetClass="entr" presetSubtype="0" fill="hold" nodeType="clickEffect">
+                                  <p:stCondLst>
+                                    <p:cond delay="0"/>
+                                  </p:stCondLst>
+                                  <p:childTnLst>
+                                    <p:set>
+                                      <p:cBhvr>
+                                        <p:cTn id="10" dur="1" fill="hold">
+                                          <p:stCondLst>
+                                            <p:cond delay="0"/>
+                                          </p:stCondLst>
+                                        </p:cTn>
+                                        <p:tgtEl>
+                                          <p:spTgt spid="444419">
+                                            <p:txEl>
+                                              <p:pRg st="2" end="2"/>
+                                            </p:txEl>
+                                          </p:spTgt>
+                                        </p:tgtEl>
+                                        <p:attrNameLst>
+                                          <p:attrName>style.visibility</p:attrName>
+                                        </p:attrNameLst>
+                                      </p:cBhvr>
+                                      <p:to>
+                                        <p:strVal val="visible"/>
+                                      </p:to>
+                                    </p:set>
+                                  </p:childTnLst>
+                                </p:cTn>
+                              </p:par>
+                            </p:childTnLst>
+                          </p:cTn>
+                        </p:par>
+                      </p:childTnLst>
+                    </p:cTn>
+                  </p:par>
+                </p:childTnLst>
+              </p:cTn>
+              <p:prevCondLst>
+                <p:cond evt="onPrev" delay="0">
+                  <p:tgtEl>
+                    <p:sldTgt/>
+                  </p:tgtEl>
+                </p:cond>
+              </p:prevCondLst>
+              <p:nextCondLst>
+                <p:cond evt="onNext" delay="0">
+                  <p:tgtEl>
+                    <p:sldTgt/>
+                  </p:tgtEl>
+                </p:cond>
+              </p:nextCondLst>
+            </p:seq>
+          </p:childTnLst>
+        </p:cTn>
       </p:par>
     </p:tnLst>
   </p:timing>
@@ -7953,11 +8056,7 @@
           <a:p>
             <a:r>
               <a:rPr lang="bg-BG" dirty="0"/>
-              <a:t>͏Типове данни и формат на представяне на </a:t>
-            </a:r>
-            <a:r>
-              <a:rPr lang="bg-BG" dirty="0" smtClean="0"/>
-              <a:t>данните</a:t>
+              <a:t>͏Типове данни и формат на представяне на данните</a:t>
             </a:r>
             <a:endParaRPr lang="en-US" dirty="0"/>
           </a:p>
@@ -8011,13 +8110,6 @@
       <p:transition spd="slow" advClick="0" advTm="5000"/>
     </mc:Fallback>
   </mc:AlternateContent>
-  <p:timing>
-    <p:tnLst>
-      <p:par>
-        <p:cTn id="1" dur="indefinite" restart="never" nodeType="tmRoot"/>
-      </p:par>
-    </p:tnLst>
-  </p:timing>
 </p:sld>
 </file>
 
@@ -8061,11 +8153,11 @@
           <a:lstStyle/>
           <a:p>
             <a:r>
-              <a:rPr lang="en-US" sz="3500" b="1" dirty="0" smtClean="0"/>
+              <a:rPr lang="en-US" sz="3500" b="1" dirty="0"/>
               <a:t>Excel</a:t>
             </a:r>
             <a:r>
-              <a:rPr lang="en-US" sz="3500" dirty="0" smtClean="0"/>
+              <a:rPr lang="en-US" sz="3500" dirty="0"/>
               <a:t> </a:t>
             </a:r>
             <a:r>
@@ -8073,54 +8165,66 @@
               <a:t>разпознава </a:t>
             </a:r>
             <a:r>
-              <a:rPr lang="bg-BG" sz="3500" dirty="0" smtClean="0"/>
-              <a:t>различните типове данни и ги </a:t>
-            </a:r>
-            <a:r>
-              <a:rPr lang="bg-BG" sz="3500" b="1" dirty="0" smtClean="0"/>
+              <a:rPr lang="bg-BG" sz="3500" b="1" dirty="0"/>
+              <a:t>различните типове данни </a:t>
+            </a:r>
+            <a:r>
+              <a:rPr lang="bg-BG" sz="3500" dirty="0"/>
+              <a:t>и ги </a:t>
+            </a:r>
+            <a:r>
+              <a:rPr lang="bg-BG" sz="3500" b="1" dirty="0"/>
               <a:t>интерпетира</a:t>
             </a:r>
             <a:r>
-              <a:rPr lang="bg-BG" sz="3500" dirty="0" smtClean="0"/>
-              <a:t> по различен начин, тъй като всеки тип има своите </a:t>
-            </a:r>
-            <a:r>
-              <a:rPr lang="bg-BG" sz="3500" b="1" dirty="0" smtClean="0"/>
+              <a:rPr lang="bg-BG" sz="3500" dirty="0"/>
+              <a:t> по </a:t>
+            </a:r>
+            <a:r>
+              <a:rPr lang="bg-BG" sz="3500" b="1" dirty="0"/>
+              <a:t>различен начин</a:t>
+            </a:r>
+            <a:r>
+              <a:rPr lang="bg-BG" sz="3500" dirty="0"/>
+              <a:t>, тъй като всеки тип има своите </a:t>
+            </a:r>
+            <a:r>
+              <a:rPr lang="bg-BG" sz="3500" b="1" dirty="0"/>
               <a:t>особености</a:t>
             </a:r>
           </a:p>
           <a:p>
             <a:r>
-              <a:rPr lang="bg-BG" sz="3500" dirty="0" smtClean="0"/>
+              <a:rPr lang="bg-BG" sz="3500" dirty="0"/>
               <a:t>В програмта има различни </a:t>
             </a:r>
             <a:r>
-              <a:rPr lang="bg-BG" sz="3500" b="1" dirty="0" smtClean="0"/>
+              <a:rPr lang="bg-BG" sz="3500" b="1" dirty="0"/>
               <a:t>типове данни </a:t>
             </a:r>
             <a:r>
-              <a:rPr lang="bg-BG" sz="3500" dirty="0" smtClean="0"/>
+              <a:rPr lang="bg-BG" sz="3500" dirty="0"/>
               <a:t>като:</a:t>
             </a:r>
           </a:p>
           <a:p>
             <a:pPr lvl="1"/>
             <a:r>
-              <a:rPr lang="bg-BG" sz="3200" b="1" dirty="0" smtClean="0"/>
+              <a:rPr lang="bg-BG" sz="3200" b="1" dirty="0"/>
               <a:t>Текст</a:t>
             </a:r>
           </a:p>
           <a:p>
             <a:pPr lvl="1"/>
             <a:r>
-              <a:rPr lang="bg-BG" sz="3200" b="1" dirty="0" smtClean="0"/>
+              <a:rPr lang="bg-BG" sz="3200" b="1" dirty="0"/>
               <a:t>Числа</a:t>
             </a:r>
           </a:p>
           <a:p>
             <a:pPr lvl="1"/>
             <a:r>
-              <a:rPr lang="bg-BG" sz="3200" b="1" dirty="0" smtClean="0"/>
+              <a:rPr lang="bg-BG" sz="3200" b="1" dirty="0"/>
               <a:t>Дати</a:t>
             </a:r>
           </a:p>
@@ -8128,18 +8232,14 @@
             <a:pPr lvl="1"/>
             <a:r>
               <a:rPr lang="bg-BG" sz="3200" b="1" dirty="0"/>
-              <a:t>В</a:t>
-            </a:r>
-            <a:r>
-              <a:rPr lang="bg-BG" sz="3200" b="1" dirty="0" smtClean="0"/>
-              <a:t>алутни данни </a:t>
-            </a:r>
-            <a:r>
-              <a:rPr lang="bg-BG" sz="3200" dirty="0" smtClean="0"/>
+              <a:t>Валутни данни </a:t>
+            </a:r>
+            <a:r>
+              <a:rPr lang="bg-BG" sz="3200" dirty="0"/>
               <a:t>и </a:t>
             </a:r>
             <a:r>
-              <a:rPr lang="bg-BG" sz="3200" b="1" dirty="0" smtClean="0"/>
+              <a:rPr lang="bg-BG" sz="3200" b="1" dirty="0"/>
               <a:t>т.н.</a:t>
             </a:r>
           </a:p>
@@ -8157,33 +8257,29 @@
               <a:t>, </a:t>
             </a:r>
             <a:r>
-              <a:rPr lang="ru-RU" sz="3500" b="1" dirty="0" smtClean="0"/>
+              <a:rPr lang="ru-RU" sz="3500" b="1" dirty="0"/>
               <a:t>цифри</a:t>
             </a:r>
             <a:r>
-              <a:rPr lang="ru-RU" sz="3500" dirty="0" smtClean="0"/>
+              <a:rPr lang="ru-RU" sz="3500" dirty="0"/>
               <a:t> и </a:t>
             </a:r>
             <a:r>
-              <a:rPr lang="ru-RU" sz="3500" b="1" dirty="0" smtClean="0"/>
+              <a:rPr lang="ru-RU" sz="3500" b="1" dirty="0"/>
               <a:t>др.</a:t>
             </a:r>
             <a:r>
-              <a:rPr lang="ru-RU" sz="3500" dirty="0" smtClean="0"/>
-              <a:t>, </a:t>
-            </a:r>
-            <a:r>
               <a:rPr lang="ru-RU" sz="3500" dirty="0"/>
-              <a:t>се третират като </a:t>
-            </a:r>
-            <a:r>
-              <a:rPr lang="ru-RU" sz="3500" b="1" dirty="0" smtClean="0"/>
+              <a:t>, се третират като </a:t>
+            </a:r>
+            <a:r>
+              <a:rPr lang="ru-RU" sz="3500" b="1" dirty="0"/>
               <a:t>текст</a:t>
             </a:r>
-            <a:endParaRPr lang="bg-BG" sz="3500" b="1" dirty="0" smtClean="0"/>
-          </a:p>
-          <a:p>
-            <a:endParaRPr lang="bg-BG" dirty="0" smtClean="0"/>
+            <a:endParaRPr lang="bg-BG" sz="3500" b="1" dirty="0"/>
+          </a:p>
+          <a:p>
+            <a:endParaRPr lang="bg-BG" dirty="0"/>
           </a:p>
         </p:txBody>
       </p:sp>
@@ -8204,17 +8300,12 @@
           <a:p>
             <a:r>
               <a:rPr lang="bg-BG" dirty="0"/>
-              <a:t>Типове </a:t>
-            </a:r>
-            <a:r>
-              <a:rPr lang="bg-BG" dirty="0" smtClean="0"/>
-              <a:t>данни в </a:t>
-            </a:r>
-            <a:r>
-              <a:rPr lang="en-US" dirty="0" smtClean="0"/>
+              <a:t>Типове данни в </a:t>
+            </a:r>
+            <a:r>
+              <a:rPr lang="en-US" dirty="0"/>
               <a:t>Excel</a:t>
             </a:r>
-            <a:endParaRPr lang="en-US" dirty="0"/>
           </a:p>
         </p:txBody>
       </p:sp>
@@ -8287,7 +8378,7 @@
               <a:buSzPct val="70000"/>
             </a:pPr>
             <a:r>
-              <a:rPr lang="bg-BG" sz="3200" b="1" dirty="0" smtClean="0">
+              <a:rPr lang="bg-BG" sz="3200" b="1" dirty="0">
                 <a:solidFill>
                   <a:schemeClr val="accent6">
                     <a:lumMod val="10000"/>
@@ -8344,7 +8435,7 @@
               <a:buSzPct val="70000"/>
             </a:pPr>
             <a:r>
-              <a:rPr lang="bg-BG" sz="3200" b="1" dirty="0" smtClean="0">
+              <a:rPr lang="bg-BG" sz="3200" b="1" dirty="0">
                 <a:solidFill>
                   <a:schemeClr val="accent6">
                     <a:lumMod val="10000"/>
@@ -8401,7 +8492,7 @@
               <a:buSzPct val="70000"/>
             </a:pPr>
             <a:r>
-              <a:rPr lang="bg-BG" sz="3200" b="1" dirty="0" smtClean="0">
+              <a:rPr lang="bg-BG" sz="3200" b="1" dirty="0">
                 <a:solidFill>
                   <a:schemeClr val="accent6">
                     <a:lumMod val="10000"/>
@@ -8458,7 +8549,7 @@
               <a:buSzPct val="70000"/>
             </a:pPr>
             <a:r>
-              <a:rPr lang="bg-BG" sz="3200" b="1" dirty="0" smtClean="0">
+              <a:rPr lang="bg-BG" sz="3200" b="1" dirty="0">
                 <a:solidFill>
                   <a:schemeClr val="accent6">
                     <a:lumMod val="10000"/>
@@ -9056,23 +9147,23 @@
           <a:lstStyle/>
           <a:p>
             <a:r>
-              <a:rPr lang="bg-BG" dirty="0" smtClean="0"/>
-              <a:t>Формата на представяне на различните типове данни се задава от </a:t>
-            </a:r>
-            <a:r>
-              <a:rPr lang="bg-BG" b="1" dirty="0" smtClean="0"/>
+              <a:rPr lang="bg-BG" dirty="0"/>
+              <a:t>Форматът на представяне на различните типове данни се задава от </a:t>
+            </a:r>
+            <a:r>
+              <a:rPr lang="bg-BG" b="1" dirty="0"/>
               <a:t>падащото меню</a:t>
             </a:r>
             <a:r>
-              <a:rPr lang="bg-BG" dirty="0" smtClean="0"/>
+              <a:rPr lang="bg-BG" dirty="0"/>
               <a:t> на </a:t>
             </a:r>
             <a:r>
-              <a:rPr lang="bg-BG" b="1" dirty="0" smtClean="0"/>
+              <a:rPr lang="bg-BG" b="1" dirty="0"/>
               <a:t>панела </a:t>
             </a:r>
             <a:r>
-              <a:rPr lang="en-US" b="1" dirty="0" smtClean="0">
+              <a:rPr lang="en-US" b="1" dirty="0">
                 <a:solidFill>
                   <a:schemeClr val="bg1"/>
                 </a:solidFill>
@@ -9080,26 +9171,26 @@
               <a:t>Number</a:t>
             </a:r>
             <a:r>
-              <a:rPr lang="en-US" b="1" dirty="0" smtClean="0"/>
+              <a:rPr lang="en-US" b="1" dirty="0"/>
               <a:t> </a:t>
             </a:r>
             <a:r>
-              <a:rPr lang="bg-BG" dirty="0" smtClean="0"/>
+              <a:rPr lang="bg-BG" dirty="0"/>
               <a:t>от </a:t>
             </a:r>
             <a:r>
-              <a:rPr lang="bg-BG" b="1" dirty="0" smtClean="0"/>
+              <a:rPr lang="bg-BG" b="1" dirty="0"/>
               <a:t>менюто </a:t>
             </a:r>
             <a:r>
-              <a:rPr lang="en-US" b="1" dirty="0" smtClean="0">
+              <a:rPr lang="en-US" b="1" dirty="0">
                 <a:solidFill>
                   <a:schemeClr val="bg1"/>
                 </a:solidFill>
               </a:rPr>
               <a:t>Home</a:t>
             </a:r>
-            <a:endParaRPr lang="bg-BG" b="1" dirty="0" smtClean="0">
+            <a:endParaRPr lang="bg-BG" b="1" dirty="0">
               <a:solidFill>
                 <a:schemeClr val="bg1"/>
               </a:solidFill>
@@ -9128,12 +9219,8 @@
           <a:lstStyle/>
           <a:p>
             <a:r>
-              <a:rPr lang="bg-BG" dirty="0" smtClean="0"/>
-              <a:t>Формат </a:t>
-            </a:r>
-            <a:r>
               <a:rPr lang="bg-BG" dirty="0"/>
-              <a:t>на представяне на данните</a:t>
+              <a:t>Формат на представяне на данните</a:t>
             </a:r>
           </a:p>
         </p:txBody>
@@ -9206,7 +9293,7 @@
               <a:buSzPct val="70000"/>
             </a:pPr>
             <a:r>
-              <a:rPr lang="bg-BG" sz="3600" b="1" dirty="0" smtClean="0">
+              <a:rPr lang="bg-BG" sz="3600" b="1" dirty="0">
                 <a:solidFill>
                   <a:schemeClr val="accent6">
                     <a:lumMod val="10000"/>
@@ -9989,7 +10076,7 @@
               <a:buSzPct val="70000"/>
             </a:pPr>
             <a:r>
-              <a:rPr lang="bg-BG" sz="3600" b="1" dirty="0" smtClean="0">
+              <a:rPr lang="bg-BG" sz="3600" b="1" dirty="0">
                 <a:solidFill>
                   <a:schemeClr val="accent6">
                     <a:lumMod val="10000"/>
@@ -10046,7 +10133,7 @@
               <a:buSzPct val="70000"/>
             </a:pPr>
             <a:r>
-              <a:rPr lang="bg-BG" sz="3600" b="1" dirty="0" smtClean="0">
+              <a:rPr lang="bg-BG" sz="3600" b="1" dirty="0">
                 <a:solidFill>
                   <a:schemeClr val="accent6">
                     <a:lumMod val="10000"/>
@@ -10103,7 +10190,7 @@
               <a:buSzPct val="70000"/>
             </a:pPr>
             <a:r>
-              <a:rPr lang="bg-BG" sz="3100" b="1" dirty="0" smtClean="0">
+              <a:rPr lang="bg-BG" sz="3100" b="1" dirty="0">
                 <a:solidFill>
                   <a:schemeClr val="accent6">
                     <a:lumMod val="10000"/>
@@ -10160,7 +10247,7 @@
               <a:buSzPct val="70000"/>
             </a:pPr>
             <a:r>
-              <a:rPr lang="bg-BG" sz="3600" b="1" dirty="0" smtClean="0">
+              <a:rPr lang="bg-BG" sz="3600" b="1" dirty="0">
                 <a:solidFill>
                   <a:schemeClr val="accent6">
                     <a:lumMod val="10000"/>
@@ -10217,7 +10304,7 @@
               <a:buSzPct val="70000"/>
             </a:pPr>
             <a:r>
-              <a:rPr lang="bg-BG" sz="3600" b="1" dirty="0" smtClean="0">
+              <a:rPr lang="bg-BG" sz="3600" b="1" dirty="0">
                 <a:solidFill>
                   <a:schemeClr val="accent6">
                     <a:lumMod val="10000"/>
@@ -10274,7 +10361,7 @@
               <a:buSzPct val="70000"/>
             </a:pPr>
             <a:r>
-              <a:rPr lang="bg-BG" sz="3600" b="1" dirty="0" smtClean="0">
+              <a:rPr lang="bg-BG" sz="3600" b="1" dirty="0">
                 <a:solidFill>
                   <a:schemeClr val="accent6">
                     <a:lumMod val="10000"/>
@@ -10331,7 +10418,7 @@
               <a:buSzPct val="70000"/>
             </a:pPr>
             <a:r>
-              <a:rPr lang="bg-BG" sz="3600" b="1" dirty="0" smtClean="0">
+              <a:rPr lang="bg-BG" sz="3600" b="1" dirty="0">
                 <a:solidFill>
                   <a:schemeClr val="accent6">
                     <a:lumMod val="10000"/>
@@ -10388,7 +10475,7 @@
               <a:buSzPct val="70000"/>
             </a:pPr>
             <a:r>
-              <a:rPr lang="bg-BG" sz="3600" b="1" dirty="0" smtClean="0">
+              <a:rPr lang="bg-BG" sz="3600" b="1" dirty="0">
                 <a:solidFill>
                   <a:schemeClr val="accent6">
                     <a:lumMod val="10000"/>
@@ -11869,22 +11956,17 @@
           <a:lstStyle/>
           <a:p>
             <a:r>
-              <a:rPr lang="bg-BG" dirty="0" smtClean="0"/>
+              <a:rPr lang="bg-BG" dirty="0"/>
               <a:t>Повече настойки за типа данни и формата им може да зададете чрез опцията </a:t>
             </a:r>
             <a:r>
-              <a:rPr lang="en-US" b="1" dirty="0" smtClean="0">
+              <a:rPr lang="en-US" b="1" dirty="0">
                 <a:solidFill>
                   <a:schemeClr val="bg1"/>
                 </a:solidFill>
               </a:rPr>
               <a:t>More Number Formats</a:t>
             </a:r>
-            <a:endParaRPr lang="en-US" b="1" dirty="0">
-              <a:solidFill>
-                <a:schemeClr val="bg1"/>
-              </a:solidFill>
-            </a:endParaRPr>
           </a:p>
         </p:txBody>
       </p:sp>
@@ -12519,7 +12601,7 @@
           <a:p>
             <a:pPr algn="ctr"/>
             <a:r>
-              <a:rPr lang="bg-BG" sz="2800" b="1" dirty="0" smtClean="0">
+              <a:rPr lang="bg-BG" sz="2800" b="1" dirty="0">
                 <a:solidFill>
                   <a:srgbClr val="FFFFFF"/>
                 </a:solidFill>
@@ -12674,7 +12756,7 @@
           <a:p>
             <a:pPr algn="ctr"/>
             <a:r>
-              <a:rPr lang="bg-BG" sz="2800" b="1" dirty="0" smtClean="0">
+              <a:rPr lang="bg-BG" sz="2800" b="1" dirty="0">
                 <a:solidFill>
                   <a:srgbClr val="FFFFFF"/>
                 </a:solidFill>
@@ -12712,12 +12794,12 @@
         <p:spPr bwMode="auto">
           <a:xfrm>
             <a:off x="5826001" y="4756918"/>
-            <a:ext cx="5927028" cy="1552082"/>
+            <a:ext cx="5927028" cy="980353"/>
           </a:xfrm>
           <a:prstGeom prst="wedgeRoundRectCallout">
             <a:avLst>
-              <a:gd name="adj1" fmla="val -40170"/>
-              <a:gd name="adj2" fmla="val -148705"/>
+              <a:gd name="adj1" fmla="val -41802"/>
+              <a:gd name="adj2" fmla="val -212381"/>
               <a:gd name="adj3" fmla="val 16667"/>
             </a:avLst>
           </a:prstGeom>
@@ -12763,7 +12845,7 @@
           <a:p>
             <a:pPr algn="ctr"/>
             <a:r>
-              <a:rPr lang="bg-BG" sz="2800" b="1" dirty="0" smtClean="0">
+              <a:rPr lang="bg-BG" sz="2800" b="1" dirty="0">
                 <a:solidFill>
                   <a:srgbClr val="FFFFFF"/>
                 </a:solidFill>
@@ -12775,7 +12857,40 @@
                   </a:outerShdw>
                 </a:effectLst>
               </a:rPr>
-              <a:t>Когато форматирате число, може да задавате колко знака след десетичната запетая да се показват</a:t>
+              <a:t>Изберете </a:t>
+            </a:r>
+            <a:r>
+              <a:rPr lang="bg-BG" sz="2800" b="1" dirty="0">
+                <a:solidFill>
+                  <a:schemeClr val="accent1">
+                    <a:lumMod val="60000"/>
+                    <a:lumOff val="40000"/>
+                  </a:schemeClr>
+                </a:solidFill>
+                <a:effectLst>
+                  <a:outerShdw blurRad="38100" dist="38100" dir="2700000" algn="tl">
+                    <a:srgbClr val="000000">
+                      <a:alpha val="43137"/>
+                    </a:srgbClr>
+                  </a:outerShdw>
+                </a:effectLst>
+              </a:rPr>
+              <a:t>колко знака след десетичната запетая </a:t>
+            </a:r>
+            <a:r>
+              <a:rPr lang="bg-BG" sz="2800" b="1" dirty="0">
+                <a:solidFill>
+                  <a:srgbClr val="FFFFFF"/>
+                </a:solidFill>
+                <a:effectLst>
+                  <a:outerShdw blurRad="38100" dist="38100" dir="2700000" algn="tl">
+                    <a:srgbClr val="000000">
+                      <a:alpha val="43137"/>
+                    </a:srgbClr>
+                  </a:outerShdw>
+                </a:effectLst>
+              </a:rPr>
+              <a:t>да се показват</a:t>
             </a:r>
             <a:endParaRPr lang="en-US" sz="2800" b="1" dirty="0">
               <a:solidFill>
@@ -13132,7 +13247,7 @@
           <a:lstStyle/>
           <a:p>
             <a:r>
-              <a:rPr lang="bg-BG" dirty="0" smtClean="0"/>
+              <a:rPr lang="bg-BG" dirty="0"/>
               <a:t>Основни типове данни</a:t>
             </a:r>
             <a:endParaRPr lang="en-US" dirty="0"/>
@@ -13148,7 +13263,7 @@
           <p:nvPr>
             <p:extLst>
               <p:ext uri="{D42A27DB-BD31-4B8C-83A1-F6EECF244321}">
-                <p14:modId xmlns:p14="http://schemas.microsoft.com/office/powerpoint/2010/main" val="459766277"/>
+                <p14:modId xmlns:p14="http://schemas.microsoft.com/office/powerpoint/2010/main" val="2151478954"/>
               </p:ext>
             </p:extLst>
           </p:nvPr>
@@ -13187,7 +13302,7 @@
                     <a:p>
                       <a:pPr algn="ctr"/>
                       <a:r>
-                        <a:rPr lang="bg-BG" sz="2800" dirty="0" smtClean="0">
+                        <a:rPr lang="bg-BG" sz="2800" dirty="0">
                           <a:solidFill>
                             <a:schemeClr val="bg2"/>
                           </a:solidFill>
@@ -13195,7 +13310,7 @@
                         <a:t>Тип</a:t>
                       </a:r>
                       <a:r>
-                        <a:rPr lang="bg-BG" sz="2800" baseline="0" dirty="0" smtClean="0">
+                        <a:rPr lang="bg-BG" sz="2800" baseline="0" dirty="0">
                           <a:solidFill>
                             <a:schemeClr val="bg2"/>
                           </a:solidFill>
@@ -13255,7 +13370,7 @@
                     <a:p>
                       <a:pPr algn="ctr"/>
                       <a:r>
-                        <a:rPr lang="bg-BG" sz="2800" dirty="0" smtClean="0">
+                        <a:rPr lang="bg-BG" sz="2800" dirty="0">
                           <a:solidFill>
                             <a:schemeClr val="bg2"/>
                           </a:solidFill>
@@ -13321,19 +13436,19 @@
                     <a:lstStyle/>
                     <a:p>
                       <a:r>
-                        <a:rPr lang="en-US" b="1" dirty="0" smtClean="0"/>
+                        <a:rPr lang="en-US" b="1" dirty="0"/>
                         <a:t>General</a:t>
                       </a:r>
                       <a:r>
-                        <a:rPr lang="en-US" baseline="0" dirty="0" smtClean="0"/>
+                        <a:rPr lang="en-US" baseline="0" dirty="0"/>
                         <a:t> (</a:t>
                       </a:r>
                       <a:r>
-                        <a:rPr lang="bg-BG" baseline="0" dirty="0" smtClean="0"/>
+                        <a:rPr lang="bg-BG" baseline="0" dirty="0"/>
                         <a:t>Общ</a:t>
                       </a:r>
                       <a:r>
-                        <a:rPr lang="en-US" baseline="0" dirty="0" smtClean="0"/>
+                        <a:rPr lang="en-US" baseline="0" dirty="0"/>
                         <a:t>)</a:t>
                       </a:r>
                       <a:endParaRPr lang="en-US" dirty="0"/>
@@ -13384,11 +13499,11 @@
                     <a:lstStyle/>
                     <a:p>
                       <a:r>
-                        <a:rPr lang="bg-BG" dirty="0" smtClean="0"/>
+                        <a:rPr lang="bg-BG" dirty="0"/>
                         <a:t>Показва данните така, както ги</a:t>
                       </a:r>
                       <a:r>
-                        <a:rPr lang="bg-BG" baseline="0" dirty="0" smtClean="0"/>
+                        <a:rPr lang="bg-BG" baseline="0" dirty="0"/>
                         <a:t> въвеждате</a:t>
                       </a:r>
                       <a:endParaRPr lang="en-US" dirty="0"/>
@@ -13446,11 +13561,11 @@
                     <a:lstStyle/>
                     <a:p>
                       <a:r>
-                        <a:rPr lang="en-US" b="1" dirty="0" smtClean="0"/>
+                        <a:rPr lang="en-US" b="1" dirty="0"/>
                         <a:t>Number</a:t>
                       </a:r>
                       <a:r>
-                        <a:rPr lang="bg-BG" dirty="0" smtClean="0"/>
+                        <a:rPr lang="bg-BG" dirty="0"/>
                         <a:t> (Число)</a:t>
                       </a:r>
                       <a:endParaRPr lang="en-US" dirty="0"/>
@@ -13501,11 +13616,11 @@
                     <a:lstStyle/>
                     <a:p>
                       <a:r>
-                        <a:rPr lang="bg-BG" dirty="0" smtClean="0"/>
+                        <a:rPr lang="bg-BG" dirty="0"/>
                         <a:t>Числов</a:t>
                       </a:r>
                       <a:r>
-                        <a:rPr lang="bg-BG" baseline="0" dirty="0" smtClean="0"/>
+                        <a:rPr lang="bg-BG" baseline="0" dirty="0"/>
                         <a:t> формат</a:t>
                       </a:r>
                       <a:endParaRPr lang="en-US" dirty="0"/>
@@ -13563,11 +13678,11 @@
                     <a:lstStyle/>
                     <a:p>
                       <a:r>
-                        <a:rPr lang="en-US" b="1" dirty="0" smtClean="0"/>
+                        <a:rPr lang="en-US" b="1" dirty="0"/>
                         <a:t>Currency</a:t>
                       </a:r>
                       <a:r>
-                        <a:rPr lang="bg-BG" dirty="0" smtClean="0"/>
+                        <a:rPr lang="bg-BG" dirty="0"/>
                         <a:t> (Валута)</a:t>
                       </a:r>
                       <a:endParaRPr lang="en-US" dirty="0"/>
@@ -13618,8 +13733,8 @@
                     <a:lstStyle/>
                     <a:p>
                       <a:r>
-                        <a:rPr lang="bg-BG" dirty="0" smtClean="0"/>
-                        <a:t>Показва знак за валута след числотово</a:t>
+                        <a:rPr lang="bg-BG" dirty="0"/>
+                        <a:t>Показва знак за валута след числото</a:t>
                       </a:r>
                       <a:endParaRPr lang="en-US" dirty="0"/>
                     </a:p>
@@ -13676,14 +13791,14 @@
                     <a:lstStyle/>
                     <a:p>
                       <a:r>
-                        <a:rPr lang="en-US" b="1" dirty="0" smtClean="0"/>
+                        <a:rPr lang="en-US" b="1" dirty="0"/>
                         <a:t>Text</a:t>
                       </a:r>
                       <a:r>
-                        <a:rPr lang="bg-BG" dirty="0" smtClean="0"/>
+                        <a:rPr lang="bg-BG" dirty="0"/>
                         <a:t> (Текст)</a:t>
                       </a:r>
-                      <a:endParaRPr lang="en-US" dirty="0" smtClean="0"/>
+                      <a:endParaRPr lang="en-US" dirty="0"/>
                     </a:p>
                   </a:txBody>
                   <a:tcPr anchor="ctr">
@@ -13731,7 +13846,7 @@
                     <a:lstStyle/>
                     <a:p>
                       <a:r>
-                        <a:rPr lang="bg-BG" dirty="0" smtClean="0"/>
+                        <a:rPr lang="bg-BG" dirty="0"/>
                         <a:t>Текстов формат</a:t>
                       </a:r>
                       <a:endParaRPr lang="en-US" dirty="0"/>
@@ -13789,11 +13904,11 @@
                     <a:lstStyle/>
                     <a:p>
                       <a:r>
-                        <a:rPr lang="en-US" b="1" dirty="0" smtClean="0"/>
+                        <a:rPr lang="en-US" b="1" dirty="0"/>
                         <a:t>Date</a:t>
                       </a:r>
                       <a:r>
-                        <a:rPr lang="bg-BG" dirty="0" smtClean="0"/>
+                        <a:rPr lang="bg-BG" dirty="0"/>
                         <a:t> (Дата)</a:t>
                       </a:r>
                       <a:endParaRPr lang="en-US" dirty="0"/>
@@ -13844,11 +13959,11 @@
                     <a:lstStyle/>
                     <a:p>
                       <a:r>
-                        <a:rPr lang="bg-BG" dirty="0" smtClean="0"/>
+                        <a:rPr lang="bg-BG" dirty="0"/>
                         <a:t>Формат за ден,</a:t>
                       </a:r>
                       <a:r>
-                        <a:rPr lang="bg-BG" baseline="0" dirty="0" smtClean="0"/>
+                        <a:rPr lang="bg-BG" baseline="0" dirty="0"/>
                         <a:t> месец и година</a:t>
                       </a:r>
                       <a:endParaRPr lang="en-US" dirty="0"/>
@@ -13906,11 +14021,11 @@
                     <a:lstStyle/>
                     <a:p>
                       <a:r>
-                        <a:rPr lang="en-US" b="1" dirty="0" smtClean="0"/>
+                        <a:rPr lang="en-US" b="1" dirty="0"/>
                         <a:t>Time</a:t>
                       </a:r>
                       <a:r>
-                        <a:rPr lang="bg-BG" dirty="0" smtClean="0"/>
+                        <a:rPr lang="bg-BG" dirty="0"/>
                         <a:t> (Час)</a:t>
                       </a:r>
                       <a:endParaRPr lang="en-US" dirty="0"/>
@@ -13961,11 +14076,11 @@
                     <a:lstStyle/>
                     <a:p>
                       <a:r>
-                        <a:rPr lang="bg-BG" dirty="0" smtClean="0"/>
+                        <a:rPr lang="bg-BG" dirty="0"/>
                         <a:t>Формат за час</a:t>
                       </a:r>
                       <a:r>
-                        <a:rPr lang="bg-BG" baseline="0" dirty="0" smtClean="0"/>
+                        <a:rPr lang="bg-BG" baseline="0" dirty="0"/>
                         <a:t>, минута и секунда</a:t>
                       </a:r>
                       <a:endParaRPr lang="en-US" dirty="0"/>
@@ -14023,15 +14138,15 @@
                     <a:lstStyle/>
                     <a:p>
                       <a:r>
-                        <a:rPr lang="en-US" b="1" dirty="0" smtClean="0"/>
+                        <a:rPr lang="en-US" b="1" dirty="0"/>
                         <a:t>Percentage</a:t>
                       </a:r>
                       <a:r>
-                        <a:rPr lang="en-US" dirty="0" smtClean="0"/>
+                        <a:rPr lang="en-US" dirty="0"/>
                         <a:t> </a:t>
                       </a:r>
                       <a:r>
-                        <a:rPr lang="bg-BG" dirty="0" smtClean="0"/>
+                        <a:rPr lang="bg-BG" dirty="0"/>
                         <a:t>(Процент)</a:t>
                       </a:r>
                       <a:endParaRPr lang="en-US" dirty="0"/>
@@ -14082,11 +14197,11 @@
                     <a:lstStyle/>
                     <a:p>
                       <a:r>
-                        <a:rPr lang="bg-BG" dirty="0" smtClean="0"/>
+                        <a:rPr lang="bg-BG" dirty="0"/>
                         <a:t>Превръща числото</a:t>
                       </a:r>
                       <a:r>
-                        <a:rPr lang="bg-BG" baseline="0" dirty="0" smtClean="0"/>
+                        <a:rPr lang="bg-BG" baseline="0" dirty="0"/>
                         <a:t> в проценти</a:t>
                       </a:r>
                       <a:endParaRPr lang="en-US" dirty="0"/>
@@ -14159,13 +14274,6 @@
       <p:transition spd="slow" advClick="0" advTm="5000"/>
     </mc:Fallback>
   </mc:AlternateContent>
-  <p:timing>
-    <p:tnLst>
-      <p:par>
-        <p:cTn id="1" dur="indefinite" restart="never" nodeType="tmRoot"/>
-      </p:par>
-    </p:tnLst>
-  </p:timing>
 </p:sld>
 </file>
 
@@ -14837,7 +14945,7 @@
               </a:buClr>
             </a:pPr>
             <a:r>
-              <a:rPr lang="ru-RU" sz="2600" b="1" dirty="0" smtClean="0">
+              <a:rPr lang="ru-RU" sz="2600" b="1" dirty="0">
                 <a:solidFill>
                   <a:schemeClr val="bg1">
                     <a:lumMod val="60000"/>
@@ -14848,7 +14956,7 @@
               <a:t>Типове данни</a:t>
             </a:r>
             <a:r>
-              <a:rPr lang="ru-RU" sz="2600" b="1" dirty="0" smtClean="0">
+              <a:rPr lang="ru-RU" sz="2600" b="1" dirty="0">
                 <a:solidFill>
                   <a:schemeClr val="bg2"/>
                 </a:solidFill>
@@ -14866,7 +14974,7 @@
               </a:buClr>
             </a:pPr>
             <a:r>
-              <a:rPr lang="ru-RU" sz="2400" b="1" dirty="0" smtClean="0">
+              <a:rPr lang="ru-RU" sz="2400" b="1" dirty="0">
                 <a:solidFill>
                   <a:schemeClr val="bg2"/>
                 </a:solidFill>
@@ -14884,7 +14992,7 @@
               </a:buClr>
             </a:pPr>
             <a:r>
-              <a:rPr lang="ru-RU" sz="2400" b="1" dirty="0" smtClean="0">
+              <a:rPr lang="ru-RU" sz="2400" b="1" dirty="0">
                 <a:solidFill>
                   <a:schemeClr val="bg2"/>
                 </a:solidFill>
@@ -14902,7 +15010,7 @@
               </a:buClr>
             </a:pPr>
             <a:r>
-              <a:rPr lang="ru-RU" sz="2400" b="1" dirty="0" smtClean="0">
+              <a:rPr lang="ru-RU" sz="2400" b="1" dirty="0">
                 <a:solidFill>
                   <a:schemeClr val="bg2"/>
                 </a:solidFill>
@@ -14920,7 +15028,7 @@
               </a:buClr>
             </a:pPr>
             <a:r>
-              <a:rPr lang="ru-RU" sz="2400" b="1" dirty="0" smtClean="0">
+              <a:rPr lang="ru-RU" sz="2400" b="1" dirty="0">
                 <a:solidFill>
                   <a:schemeClr val="bg2"/>
                 </a:solidFill>
@@ -14928,7 +15036,7 @@
               <a:t>Валутни данни </a:t>
             </a:r>
             <a:r>
-              <a:rPr lang="ru-RU" sz="2400" dirty="0" smtClean="0">
+              <a:rPr lang="ru-RU" sz="2400" dirty="0">
                 <a:solidFill>
                   <a:schemeClr val="bg2"/>
                 </a:solidFill>
@@ -14946,7 +15054,7 @@
               </a:buClr>
             </a:pPr>
             <a:r>
-              <a:rPr lang="ru-RU" sz="2600" b="1" dirty="0" smtClean="0">
+              <a:rPr lang="ru-RU" sz="2600" b="1" dirty="0">
                 <a:solidFill>
                   <a:schemeClr val="bg1">
                     <a:lumMod val="60000"/>
@@ -14957,7 +15065,7 @@
               <a:t>Форматиране</a:t>
             </a:r>
             <a:r>
-              <a:rPr lang="ru-RU" sz="2600" dirty="0" smtClean="0">
+              <a:rPr lang="ru-RU" sz="2600" dirty="0">
                 <a:solidFill>
                   <a:schemeClr val="bg2"/>
                 </a:solidFill>
@@ -14965,33 +15073,13 @@
               <a:t> на различните типове </a:t>
             </a:r>
             <a:r>
-              <a:rPr lang="ru-RU" sz="2600" b="1" dirty="0" smtClean="0">
+              <a:rPr lang="ru-RU" sz="2600" b="1" dirty="0">
                 <a:solidFill>
                   <a:schemeClr val="bg2"/>
                 </a:solidFill>
               </a:rPr>
               <a:t>данни</a:t>
             </a:r>
-            <a:endParaRPr lang="ru-RU" sz="2600" b="1" dirty="0">
-              <a:solidFill>
-                <a:schemeClr val="bg2"/>
-              </a:solidFill>
-            </a:endParaRPr>
-          </a:p>
-          <a:p>
-            <a:pPr marL="355600" indent="-355600">
-              <a:lnSpc>
-                <a:spcPct val="100000"/>
-              </a:lnSpc>
-              <a:buClr>
-                <a:schemeClr val="bg2"/>
-              </a:buClr>
-            </a:pPr>
-            <a:endParaRPr lang="ru-RU" sz="2800" b="1" dirty="0" smtClean="0">
-              <a:solidFill>
-                <a:schemeClr val="bg2"/>
-              </a:solidFill>
-            </a:endParaRPr>
           </a:p>
           <a:p>
             <a:pPr marL="355600" indent="-355600">
@@ -15017,7 +15105,22 @@
                 <a:schemeClr val="bg2"/>
               </a:buClr>
             </a:pPr>
-            <a:endParaRPr lang="en-US" sz="2400" dirty="0" smtClean="0">
+            <a:endParaRPr lang="ru-RU" sz="2800" b="1" dirty="0">
+              <a:solidFill>
+                <a:schemeClr val="bg2"/>
+              </a:solidFill>
+            </a:endParaRPr>
+          </a:p>
+          <a:p>
+            <a:pPr marL="355600" indent="-355600">
+              <a:lnSpc>
+                <a:spcPct val="100000"/>
+              </a:lnSpc>
+              <a:buClr>
+                <a:schemeClr val="bg2"/>
+              </a:buClr>
+            </a:pPr>
+            <a:endParaRPr lang="en-US" sz="2400" dirty="0">
               <a:solidFill>
                 <a:schemeClr val="bg2"/>
               </a:solidFill>

</xml_diff>